<commit_message>
Run JAR and WAR.
</commit_message>
<xml_diff>
--- a/15_Ch33_Actuator.pptx
+++ b/15_Ch33_Actuator.pptx
@@ -6609,12 +6609,17 @@
         </p:blipFill>
         <p:spPr>
           <a:xfrm>
-            <a:off x="1115616" y="2036252"/>
-            <a:ext cx="5310039" cy="2785495"/>
+            <a:off x="1115616" y="2083666"/>
+            <a:ext cx="6912768" cy="3626241"/>
           </a:xfrm>
           <a:prstGeom prst="rect">
             <a:avLst/>
           </a:prstGeom>
+          <a:ln>
+            <a:solidFill>
+              <a:srgbClr val="C00000"/>
+            </a:solidFill>
+          </a:ln>
         </p:spPr>
       </p:pic>
     </p:spTree>

</xml_diff>